<commit_message>
precarite dans le tmp
</commit_message>
<xml_diff>
--- a/render/EurometropoleQPV.pptx
+++ b/render/EurometropoleQPV.pptx
@@ -9,8 +9,11 @@
     <p:sldId id="257" r:id="rId3"/>
     <p:sldId id="258" r:id="rId4"/>
     <p:sldId id="260" r:id="rId5"/>
-    <p:sldId id="259" r:id="rId6"/>
-    <p:sldId id="261" r:id="rId7"/>
+    <p:sldId id="264" r:id="rId6"/>
+    <p:sldId id="259" r:id="rId7"/>
+    <p:sldId id="261" r:id="rId8"/>
+    <p:sldId id="263" r:id="rId9"/>
+    <p:sldId id="262" r:id="rId10"/>
   </p:sldIdLst>
   <p:sldSz cx="12192000" cy="6858000"/>
   <p:notesSz cx="6858000" cy="9144000"/>
@@ -243,6 +246,11 @@
       </a:defRPr>
     </a:lvl9pPr>
   </p:defaultTextStyle>
+  <p:extLst>
+    <p:ext uri="{EFAFB233-063F-42B5-8137-9DF3F51BA10A}">
+      <p15:sldGuideLst xmlns:p15="http://schemas.microsoft.com/office/powerpoint/2012/main"/>
+    </p:ext>
+  </p:extLst>
 </p:presentation>
 </file>
 
@@ -1883,6 +1891,10 @@
         <a:bodyPr/>
         <a:lstStyle/>
         <a:p>
+          <a:r>
+            <a:rPr lang="fr-FR" altLang="fr-FR" dirty="0"/>
+            <a:t>Précarité financière </a:t>
+          </a:r>
           <a:endParaRPr lang="fr-FR" dirty="0"/>
         </a:p>
       </dgm:t>
@@ -2718,6 +2730,10 @@
             </a:spcAft>
             <a:buNone/>
           </a:pPr>
+          <a:r>
+            <a:rPr lang="fr-FR" altLang="fr-FR" sz="4100" kern="1200" dirty="0"/>
+            <a:t>Précarité financière </a:t>
+          </a:r>
           <a:endParaRPr lang="fr-FR" sz="4100" kern="1200" dirty="0"/>
         </a:p>
       </dsp:txBody>
@@ -5886,7 +5902,7 @@
           <a:p>
             <a:fld id="{20A98212-9D74-4955-A78A-33C385461111}" type="datetimeFigureOut">
               <a:rPr lang="fr-FR" smtClean="0"/>
-              <a:t>04/12/2023</a:t>
+              <a:t>12/01/2024</a:t>
             </a:fld>
             <a:endParaRPr lang="fr-FR"/>
           </a:p>
@@ -6431,7 +6447,7 @@
           <a:p>
             <a:fld id="{20A98212-9D74-4955-A78A-33C385461111}" type="datetimeFigureOut">
               <a:rPr lang="fr-FR" smtClean="0"/>
-              <a:t>04/12/2023</a:t>
+              <a:t>12/01/2024</a:t>
             </a:fld>
             <a:endParaRPr lang="fr-FR"/>
           </a:p>
@@ -6586,7 +6602,7 @@
           <a:p>
             <a:fld id="{20A98212-9D74-4955-A78A-33C385461111}" type="datetimeFigureOut">
               <a:rPr lang="fr-FR" smtClean="0"/>
-              <a:t>04/12/2023</a:t>
+              <a:t>12/01/2024</a:t>
             </a:fld>
             <a:endParaRPr lang="fr-FR"/>
           </a:p>
@@ -8230,7 +8246,7 @@
           <a:p>
             <a:fld id="{20A98212-9D74-4955-A78A-33C385461111}" type="datetimeFigureOut">
               <a:rPr lang="fr-FR" smtClean="0"/>
-              <a:t>04/12/2023</a:t>
+              <a:t>12/01/2024</a:t>
             </a:fld>
             <a:endParaRPr lang="fr-FR"/>
           </a:p>
@@ -8663,7 +8679,7 @@
           <a:p>
             <a:fld id="{20A98212-9D74-4955-A78A-33C385461111}" type="datetimeFigureOut">
               <a:rPr lang="fr-FR" smtClean="0"/>
-              <a:t>04/12/2023</a:t>
+              <a:t>12/01/2024</a:t>
             </a:fld>
             <a:endParaRPr lang="fr-FR"/>
           </a:p>
@@ -9283,7 +9299,7 @@
           <a:p>
             <a:fld id="{20A98212-9D74-4955-A78A-33C385461111}" type="datetimeFigureOut">
               <a:rPr lang="fr-FR" smtClean="0"/>
-              <a:t>04/12/2023</a:t>
+              <a:t>12/01/2024</a:t>
             </a:fld>
             <a:endParaRPr lang="fr-FR"/>
           </a:p>
@@ -9870,7 +9886,7 @@
           <a:p>
             <a:fld id="{20A98212-9D74-4955-A78A-33C385461111}" type="datetimeFigureOut">
               <a:rPr lang="fr-FR" smtClean="0"/>
-              <a:t>04/12/2023</a:t>
+              <a:t>12/01/2024</a:t>
             </a:fld>
             <a:endParaRPr lang="fr-FR"/>
           </a:p>
@@ -10627,7 +10643,7 @@
           <a:p>
             <a:fld id="{20A98212-9D74-4955-A78A-33C385461111}" type="datetimeFigureOut">
               <a:rPr lang="fr-FR" smtClean="0"/>
-              <a:t>04/12/2023</a:t>
+              <a:t>12/01/2024</a:t>
             </a:fld>
             <a:endParaRPr lang="fr-FR"/>
           </a:p>
@@ -11214,7 +11230,7 @@
           <a:p>
             <a:fld id="{20A98212-9D74-4955-A78A-33C385461111}" type="datetimeFigureOut">
               <a:rPr lang="fr-FR" smtClean="0"/>
-              <a:t>04/12/2023</a:t>
+              <a:t>12/01/2024</a:t>
             </a:fld>
             <a:endParaRPr lang="fr-FR"/>
           </a:p>
@@ -11512,7 +11528,7 @@
           <a:p>
             <a:fld id="{20A98212-9D74-4955-A78A-33C385461111}" type="datetimeFigureOut">
               <a:rPr lang="fr-FR" smtClean="0"/>
-              <a:t>04/12/2023</a:t>
+              <a:t>12/01/2024</a:t>
             </a:fld>
             <a:endParaRPr lang="fr-FR"/>
           </a:p>
@@ -12051,7 +12067,7 @@
           <a:p>
             <a:fld id="{20A98212-9D74-4955-A78A-33C385461111}" type="datetimeFigureOut">
               <a:rPr lang="fr-FR" smtClean="0"/>
-              <a:t>04/12/2023</a:t>
+              <a:t>12/01/2024</a:t>
             </a:fld>
             <a:endParaRPr lang="fr-FR"/>
           </a:p>
@@ -12907,7 +12923,7 @@
           <a:p>
             <a:fld id="{20A98212-9D74-4955-A78A-33C385461111}" type="datetimeFigureOut">
               <a:rPr lang="fr-FR" smtClean="0"/>
-              <a:t>04/12/2023</a:t>
+              <a:t>12/01/2024</a:t>
             </a:fld>
             <a:endParaRPr lang="fr-FR"/>
           </a:p>
@@ -13155,7 +13171,7 @@
           <a:p>
             <a:fld id="{20A98212-9D74-4955-A78A-33C385461111}" type="datetimeFigureOut">
               <a:rPr lang="fr-FR" smtClean="0"/>
-              <a:t>04/12/2023</a:t>
+              <a:t>12/01/2024</a:t>
             </a:fld>
             <a:endParaRPr lang="fr-FR"/>
           </a:p>
@@ -13648,7 +13664,7 @@
           <a:p>
             <a:fld id="{20A98212-9D74-4955-A78A-33C385461111}" type="datetimeFigureOut">
               <a:rPr lang="fr-FR" smtClean="0"/>
-              <a:t>04/12/2023</a:t>
+              <a:t>12/01/2024</a:t>
             </a:fld>
             <a:endParaRPr lang="fr-FR"/>
           </a:p>
@@ -14756,7 +14772,7 @@
           <a:p>
             <a:fld id="{20A98212-9D74-4955-A78A-33C385461111}" type="datetimeFigureOut">
               <a:rPr lang="fr-FR" smtClean="0"/>
-              <a:t>04/12/2023</a:t>
+              <a:t>12/01/2024</a:t>
             </a:fld>
             <a:endParaRPr lang="fr-FR"/>
           </a:p>
@@ -15189,7 +15205,7 @@
           <a:p>
             <a:fld id="{20A98212-9D74-4955-A78A-33C385461111}" type="datetimeFigureOut">
               <a:rPr lang="fr-FR" smtClean="0"/>
-              <a:t>04/12/2023</a:t>
+              <a:t>12/01/2024</a:t>
             </a:fld>
             <a:endParaRPr lang="fr-FR"/>
           </a:p>
@@ -15809,7 +15825,7 @@
           <a:p>
             <a:fld id="{20A98212-9D74-4955-A78A-33C385461111}" type="datetimeFigureOut">
               <a:rPr lang="fr-FR" smtClean="0"/>
-              <a:t>04/12/2023</a:t>
+              <a:t>12/01/2024</a:t>
             </a:fld>
             <a:endParaRPr lang="fr-FR"/>
           </a:p>
@@ -16294,7 +16310,7 @@
           <a:p>
             <a:fld id="{20A98212-9D74-4955-A78A-33C385461111}" type="datetimeFigureOut">
               <a:rPr lang="fr-FR" smtClean="0"/>
-              <a:t>04/12/2023</a:t>
+              <a:t>12/01/2024</a:t>
             </a:fld>
             <a:endParaRPr lang="fr-FR"/>
           </a:p>
@@ -16923,7 +16939,7 @@
           <a:p>
             <a:fld id="{20A98212-9D74-4955-A78A-33C385461111}" type="datetimeFigureOut">
               <a:rPr lang="fr-FR" smtClean="0"/>
-              <a:t>04/12/2023</a:t>
+              <a:t>12/01/2024</a:t>
             </a:fld>
             <a:endParaRPr lang="fr-FR"/>
           </a:p>
@@ -17249,7 +17265,7 @@
           <a:p>
             <a:fld id="{20A98212-9D74-4955-A78A-33C385461111}" type="datetimeFigureOut">
               <a:rPr lang="fr-FR" smtClean="0"/>
-              <a:t>04/12/2023</a:t>
+              <a:t>12/01/2024</a:t>
             </a:fld>
             <a:endParaRPr lang="fr-FR"/>
           </a:p>
@@ -17921,7 +17937,7 @@
           <a:p>
             <a:fld id="{20A98212-9D74-4955-A78A-33C385461111}" type="datetimeFigureOut">
               <a:rPr lang="fr-FR" smtClean="0"/>
-              <a:t>04/12/2023</a:t>
+              <a:t>12/01/2024</a:t>
             </a:fld>
             <a:endParaRPr lang="fr-FR"/>
           </a:p>
@@ -19160,7 +19176,7 @@
           <p:nvPr>
             <p:extLst>
               <p:ext uri="{D42A27DB-BD31-4B8C-83A1-F6EECF244321}">
-                <p14:modId xmlns:p14="http://schemas.microsoft.com/office/powerpoint/2010/main" val="2258542276"/>
+                <p14:modId xmlns:p14="http://schemas.microsoft.com/office/powerpoint/2010/main" val="2492323774"/>
               </p:ext>
             </p:extLst>
           </p:nvPr>
@@ -19314,7 +19330,7 @@
           <a:p>
             <a:r>
               <a:rPr lang="fr-FR" dirty="0"/>
-              <a:t>Les jeunes au sein de la QPV</a:t>
+              <a:t>Les jeunes au sein des QPV</a:t>
             </a:r>
           </a:p>
         </p:txBody>
@@ -19424,6 +19440,64 @@
 </file>
 
 <file path=ppt/slides/slide5.xml><?xml version="1.0" encoding="utf-8"?>
+<p:sld xmlns:a="http://schemas.openxmlformats.org/drawingml/2006/main" xmlns:r="http://schemas.openxmlformats.org/officeDocument/2006/relationships" xmlns:p="http://schemas.openxmlformats.org/presentationml/2006/main">
+  <p:cSld>
+    <p:spTree>
+      <p:nvGrpSpPr>
+        <p:cNvPr id="1" name=""/>
+        <p:cNvGrpSpPr/>
+        <p:nvPr/>
+      </p:nvGrpSpPr>
+      <p:grpSpPr>
+        <a:xfrm>
+          <a:off x="0" y="0"/>
+          <a:ext cx="0" cy="0"/>
+          <a:chOff x="0" y="0"/>
+          <a:chExt cx="0" cy="0"/>
+        </a:xfrm>
+      </p:grpSpPr>
+      <p:sp>
+        <p:nvSpPr>
+          <p:cNvPr id="2" name="Titre 1">
+            <a:extLst>
+              <a:ext uri="{FF2B5EF4-FFF2-40B4-BE49-F238E27FC236}">
+                <a16:creationId xmlns:a16="http://schemas.microsoft.com/office/drawing/2014/main" id="{51CF4079-A3E6-4293-630C-F94BCFFBCCBB}"/>
+              </a:ext>
+            </a:extLst>
+          </p:cNvPr>
+          <p:cNvSpPr>
+            <a:spLocks noGrp="1"/>
+          </p:cNvSpPr>
+          <p:nvPr>
+            <p:ph type="title"/>
+          </p:nvPr>
+        </p:nvSpPr>
+        <p:spPr/>
+        <p:txBody>
+          <a:bodyPr/>
+          <a:lstStyle/>
+          <a:p>
+            <a:r>
+              <a:rPr lang="fr-FR" dirty="0"/>
+              <a:t>Scolarisation en QPV</a:t>
+            </a:r>
+          </a:p>
+        </p:txBody>
+      </p:sp>
+    </p:spTree>
+    <p:extLst>
+      <p:ext uri="{BB962C8B-B14F-4D97-AF65-F5344CB8AC3E}">
+        <p14:creationId xmlns:p14="http://schemas.microsoft.com/office/powerpoint/2010/main" val="584572875"/>
+      </p:ext>
+    </p:extLst>
+  </p:cSld>
+  <p:clrMapOvr>
+    <a:masterClrMapping/>
+  </p:clrMapOvr>
+</p:sld>
+</file>
+
+<file path=ppt/slides/slide6.xml><?xml version="1.0" encoding="utf-8"?>
 <p:sld xmlns:a="http://schemas.openxmlformats.org/drawingml/2006/main" xmlns:r="http://schemas.openxmlformats.org/officeDocument/2006/relationships" xmlns:p="http://schemas.openxmlformats.org/presentationml/2006/main">
   <p:cSld>
     <p:spTree>
@@ -19577,7 +19651,7 @@
 </p:sld>
 </file>
 
-<file path=ppt/slides/slide6.xml><?xml version="1.0" encoding="utf-8"?>
+<file path=ppt/slides/slide7.xml><?xml version="1.0" encoding="utf-8"?>
 <p:sld xmlns:a="http://schemas.openxmlformats.org/drawingml/2006/main" xmlns:r="http://schemas.openxmlformats.org/officeDocument/2006/relationships" xmlns:p="http://schemas.openxmlformats.org/presentationml/2006/main">
   <p:cSld>
     <p:spTree>
@@ -19691,6 +19765,177 @@
     <p:extLst>
       <p:ext uri="{BB962C8B-B14F-4D97-AF65-F5344CB8AC3E}">
         <p14:creationId xmlns:p14="http://schemas.microsoft.com/office/powerpoint/2010/main" val="835497300"/>
+      </p:ext>
+    </p:extLst>
+  </p:cSld>
+  <p:clrMapOvr>
+    <a:masterClrMapping/>
+  </p:clrMapOvr>
+</p:sld>
+</file>
+
+<file path=ppt/slides/slide8.xml><?xml version="1.0" encoding="utf-8"?>
+<p:sld xmlns:a="http://schemas.openxmlformats.org/drawingml/2006/main" xmlns:r="http://schemas.openxmlformats.org/officeDocument/2006/relationships" xmlns:p="http://schemas.openxmlformats.org/presentationml/2006/main">
+  <p:cSld>
+    <p:spTree>
+      <p:nvGrpSpPr>
+        <p:cNvPr id="1" name=""/>
+        <p:cNvGrpSpPr/>
+        <p:nvPr/>
+      </p:nvGrpSpPr>
+      <p:grpSpPr>
+        <a:xfrm>
+          <a:off x="0" y="0"/>
+          <a:ext cx="0" cy="0"/>
+          <a:chOff x="0" y="0"/>
+          <a:chExt cx="0" cy="0"/>
+        </a:xfrm>
+      </p:grpSpPr>
+      <p:sp>
+        <p:nvSpPr>
+          <p:cNvPr id="2" name="Titre 1">
+            <a:extLst>
+              <a:ext uri="{FF2B5EF4-FFF2-40B4-BE49-F238E27FC236}">
+                <a16:creationId xmlns:a16="http://schemas.microsoft.com/office/drawing/2014/main" id="{7F0BA33F-EC4D-F597-D7DF-470339C8374B}"/>
+              </a:ext>
+            </a:extLst>
+          </p:cNvPr>
+          <p:cNvSpPr>
+            <a:spLocks noGrp="1"/>
+          </p:cNvSpPr>
+          <p:nvPr>
+            <p:ph type="title"/>
+          </p:nvPr>
+        </p:nvSpPr>
+        <p:spPr>
+          <a:xfrm>
+            <a:off x="3090600" y="1742800"/>
+            <a:ext cx="6010800" cy="3372400"/>
+          </a:xfrm>
+        </p:spPr>
+        <p:txBody>
+          <a:bodyPr wrap="square" anchor="ctr">
+            <a:normAutofit/>
+          </a:bodyPr>
+          <a:lstStyle/>
+          <a:p>
+            <a:r>
+              <a:rPr lang="fr-FR" altLang="fr-FR" dirty="0"/>
+              <a:t>Précarité financière </a:t>
+            </a:r>
+            <a:endParaRPr lang="fr-FR" dirty="0"/>
+          </a:p>
+        </p:txBody>
+      </p:sp>
+    </p:spTree>
+    <p:extLst>
+      <p:ext uri="{BB962C8B-B14F-4D97-AF65-F5344CB8AC3E}">
+        <p14:creationId xmlns:p14="http://schemas.microsoft.com/office/powerpoint/2010/main" val="1611071758"/>
+      </p:ext>
+    </p:extLst>
+  </p:cSld>
+  <p:clrMapOvr>
+    <a:masterClrMapping/>
+  </p:clrMapOvr>
+</p:sld>
+</file>
+
+<file path=ppt/slides/slide9.xml><?xml version="1.0" encoding="utf-8"?>
+<p:sld xmlns:a="http://schemas.openxmlformats.org/drawingml/2006/main" xmlns:r="http://schemas.openxmlformats.org/officeDocument/2006/relationships" xmlns:p="http://schemas.openxmlformats.org/presentationml/2006/main">
+  <p:cSld>
+    <p:spTree>
+      <p:nvGrpSpPr>
+        <p:cNvPr id="1" name=""/>
+        <p:cNvGrpSpPr/>
+        <p:nvPr/>
+      </p:nvGrpSpPr>
+      <p:grpSpPr>
+        <a:xfrm>
+          <a:off x="0" y="0"/>
+          <a:ext cx="0" cy="0"/>
+          <a:chOff x="0" y="0"/>
+          <a:chExt cx="0" cy="0"/>
+        </a:xfrm>
+      </p:grpSpPr>
+      <p:sp>
+        <p:nvSpPr>
+          <p:cNvPr id="2" name="Titre 1">
+            <a:extLst>
+              <a:ext uri="{FF2B5EF4-FFF2-40B4-BE49-F238E27FC236}">
+                <a16:creationId xmlns:a16="http://schemas.microsoft.com/office/drawing/2014/main" id="{BA3D6D1D-E57D-CB80-C0C0-68EBD8438B21}"/>
+              </a:ext>
+            </a:extLst>
+          </p:cNvPr>
+          <p:cNvSpPr>
+            <a:spLocks noGrp="1"/>
+          </p:cNvSpPr>
+          <p:nvPr>
+            <p:ph type="title"/>
+          </p:nvPr>
+        </p:nvSpPr>
+        <p:spPr/>
+        <p:txBody>
+          <a:bodyPr/>
+          <a:lstStyle/>
+          <a:p>
+            <a:endParaRPr lang="fr-FR"/>
+          </a:p>
+        </p:txBody>
+      </p:sp>
+      <p:sp>
+        <p:nvSpPr>
+          <p:cNvPr id="3" name="Sous-titre 2">
+            <a:extLst>
+              <a:ext uri="{FF2B5EF4-FFF2-40B4-BE49-F238E27FC236}">
+                <a16:creationId xmlns:a16="http://schemas.microsoft.com/office/drawing/2014/main" id="{489B8A99-5160-442E-69C4-967E51BD3716}"/>
+              </a:ext>
+            </a:extLst>
+          </p:cNvPr>
+          <p:cNvSpPr>
+            <a:spLocks noGrp="1"/>
+          </p:cNvSpPr>
+          <p:nvPr>
+            <p:ph type="subTitle" idx="1"/>
+          </p:nvPr>
+        </p:nvSpPr>
+        <p:spPr/>
+        <p:txBody>
+          <a:bodyPr/>
+          <a:lstStyle/>
+          <a:p>
+            <a:endParaRPr lang="fr-FR"/>
+          </a:p>
+        </p:txBody>
+      </p:sp>
+      <p:sp>
+        <p:nvSpPr>
+          <p:cNvPr id="4" name="Sous-titre 3">
+            <a:extLst>
+              <a:ext uri="{FF2B5EF4-FFF2-40B4-BE49-F238E27FC236}">
+                <a16:creationId xmlns:a16="http://schemas.microsoft.com/office/drawing/2014/main" id="{81955F57-4077-1533-2120-7060963714C2}"/>
+              </a:ext>
+            </a:extLst>
+          </p:cNvPr>
+          <p:cNvSpPr>
+            <a:spLocks noGrp="1"/>
+          </p:cNvSpPr>
+          <p:nvPr>
+            <p:ph type="subTitle" idx="2"/>
+          </p:nvPr>
+        </p:nvSpPr>
+        <p:spPr/>
+        <p:txBody>
+          <a:bodyPr/>
+          <a:lstStyle/>
+          <a:p>
+            <a:endParaRPr lang="fr-FR"/>
+          </a:p>
+        </p:txBody>
+      </p:sp>
+    </p:spTree>
+    <p:extLst>
+      <p:ext uri="{BB962C8B-B14F-4D97-AF65-F5344CB8AC3E}">
+        <p14:creationId xmlns:p14="http://schemas.microsoft.com/office/powerpoint/2010/main" val="467528454"/>
       </p:ext>
     </p:extLst>
   </p:cSld>

</xml_diff>